<commit_message>
se subio la presentacion y codigo
</commit_message>
<xml_diff>
--- a/EDA-M2/Presentacion/Arboles_Grupo3.pptx
+++ b/EDA-M2/Presentacion/Arboles_Grupo3.pptx
@@ -3849,6 +3849,54 @@
           </a:prstGeom>
         </p:spPr>
       </p:pic>
+      <p:sp>
+        <p:nvSpPr>
+          <p:cNvPr id="4" name="CuadroTexto 3">
+            <a:extLst>
+              <a:ext uri="{FF2B5EF4-FFF2-40B4-BE49-F238E27FC236}">
+                <a16:creationId xmlns:a16="http://schemas.microsoft.com/office/drawing/2014/main" id="{53A43E4A-009A-455B-B2A7-71913F8F76E5}"/>
+              </a:ext>
+            </a:extLst>
+          </p:cNvPr>
+          <p:cNvSpPr txBox="1"/>
+          <p:nvPr/>
+        </p:nvSpPr>
+        <p:spPr>
+          <a:xfrm>
+            <a:off x="7447722" y="5897217"/>
+            <a:ext cx="4144689" cy="369332"/>
+          </a:xfrm>
+          <a:prstGeom prst="rect">
+            <a:avLst/>
+          </a:prstGeom>
+          <a:noFill/>
+        </p:spPr>
+        <p:txBody>
+          <a:bodyPr wrap="square" rtlCol="0">
+            <a:spAutoFit/>
+          </a:bodyPr>
+          <a:lstStyle/>
+          <a:p>
+            <a:r>
+              <a:rPr lang="es-PE" dirty="0"/>
+              <a:t>La </a:t>
+            </a:r>
+            <a:r>
+              <a:rPr lang="es-PE" dirty="0" err="1"/>
+              <a:t>fig</a:t>
+            </a:r>
+            <a:r>
+              <a:rPr lang="es-PE" dirty="0"/>
+              <a:t> 1. Muestra un ejemplo de </a:t>
+            </a:r>
+            <a:r>
+              <a:rPr lang="es-PE" dirty="0" err="1"/>
+              <a:t>arbol</a:t>
+            </a:r>
+            <a:endParaRPr lang="es-PE" dirty="0"/>
+          </a:p>
+        </p:txBody>
+      </p:sp>
     </p:spTree>
     <p:extLst>
       <p:ext uri="{BB962C8B-B14F-4D97-AF65-F5344CB8AC3E}">
@@ -4096,27 +4144,7 @@
                 <a:effectLst/>
                 <a:latin typeface="Open Sans" panose="020B0606030504020204" pitchFamily="34" charset="0"/>
               </a:rPr>
-              <a:t> Estos son todos aquellos nodos que no son la raíz  y que </a:t>
-            </a:r>
-            <a:r>
-              <a:rPr lang="es-ES" b="0" i="0" dirty="0" err="1">
-                <a:solidFill>
-                  <a:srgbClr val="6B6B6B"/>
-                </a:solidFill>
-                <a:effectLst/>
-                <a:latin typeface="Open Sans" panose="020B0606030504020204" pitchFamily="34" charset="0"/>
-              </a:rPr>
-              <a:t>ademas</a:t>
-            </a:r>
-            <a:r>
-              <a:rPr lang="es-ES" b="0" i="0" dirty="0">
-                <a:solidFill>
-                  <a:srgbClr val="6B6B6B"/>
-                </a:solidFill>
-                <a:effectLst/>
-                <a:latin typeface="Open Sans" panose="020B0606030504020204" pitchFamily="34" charset="0"/>
-              </a:rPr>
-              <a:t> tiene al menos un hijo.</a:t>
+              <a:t> Estos son todos aquellos nodos que no son la raíz  y que además tiene al menos un hijo.</a:t>
             </a:r>
           </a:p>
           <a:p>
@@ -4171,6 +4199,41 @@
           </a:extLst>
         </p:spPr>
       </p:pic>
+      <p:sp>
+        <p:nvSpPr>
+          <p:cNvPr id="4" name="CuadroTexto 3">
+            <a:extLst>
+              <a:ext uri="{FF2B5EF4-FFF2-40B4-BE49-F238E27FC236}">
+                <a16:creationId xmlns:a16="http://schemas.microsoft.com/office/drawing/2014/main" id="{1C500993-BAAD-4605-8E96-DFB5706976C5}"/>
+              </a:ext>
+            </a:extLst>
+          </p:cNvPr>
+          <p:cNvSpPr txBox="1"/>
+          <p:nvPr/>
+        </p:nvSpPr>
+        <p:spPr>
+          <a:xfrm>
+            <a:off x="7116417" y="5353878"/>
+            <a:ext cx="4867365" cy="646331"/>
+          </a:xfrm>
+          <a:prstGeom prst="rect">
+            <a:avLst/>
+          </a:prstGeom>
+          <a:noFill/>
+        </p:spPr>
+        <p:txBody>
+          <a:bodyPr wrap="square" rtlCol="0">
+            <a:spAutoFit/>
+          </a:bodyPr>
+          <a:lstStyle/>
+          <a:p>
+            <a:r>
+              <a:rPr lang="es-PE" dirty="0"/>
+              <a:t>La figura 2: muestra las parte principales de un Árbol</a:t>
+            </a:r>
+          </a:p>
+        </p:txBody>
+      </p:sp>
     </p:spTree>
     <p:extLst>
       <p:ext uri="{BB962C8B-B14F-4D97-AF65-F5344CB8AC3E}">
@@ -4401,6 +4464,41 @@
           </a:extLst>
         </p:spPr>
       </p:pic>
+      <p:sp>
+        <p:nvSpPr>
+          <p:cNvPr id="4" name="CuadroTexto 3">
+            <a:extLst>
+              <a:ext uri="{FF2B5EF4-FFF2-40B4-BE49-F238E27FC236}">
+                <a16:creationId xmlns:a16="http://schemas.microsoft.com/office/drawing/2014/main" id="{C0C67020-74C7-447F-86EF-84891F9525A8}"/>
+              </a:ext>
+            </a:extLst>
+          </p:cNvPr>
+          <p:cNvSpPr txBox="1"/>
+          <p:nvPr/>
+        </p:nvSpPr>
+        <p:spPr>
+          <a:xfrm>
+            <a:off x="6606830" y="5645426"/>
+            <a:ext cx="5227361" cy="369332"/>
+          </a:xfrm>
+          <a:prstGeom prst="rect">
+            <a:avLst/>
+          </a:prstGeom>
+          <a:noFill/>
+        </p:spPr>
+        <p:txBody>
+          <a:bodyPr wrap="square" rtlCol="0">
+            <a:spAutoFit/>
+          </a:bodyPr>
+          <a:lstStyle/>
+          <a:p>
+            <a:r>
+              <a:rPr lang="es-PE" dirty="0"/>
+              <a:t>Figura 3: Muestra un árbol binario balanceado</a:t>
+            </a:r>
+          </a:p>
+        </p:txBody>
+      </p:sp>
     </p:spTree>
     <p:extLst>
       <p:ext uri="{BB962C8B-B14F-4D97-AF65-F5344CB8AC3E}">
@@ -4618,6 +4716,41 @@
           </a:extLst>
         </p:spPr>
       </p:pic>
+      <p:sp>
+        <p:nvSpPr>
+          <p:cNvPr id="4" name="CuadroTexto 3">
+            <a:extLst>
+              <a:ext uri="{FF2B5EF4-FFF2-40B4-BE49-F238E27FC236}">
+                <a16:creationId xmlns:a16="http://schemas.microsoft.com/office/drawing/2014/main" id="{A766CEB3-7942-47B2-B89B-73B3877B8B15}"/>
+              </a:ext>
+            </a:extLst>
+          </p:cNvPr>
+          <p:cNvSpPr txBox="1"/>
+          <p:nvPr/>
+        </p:nvSpPr>
+        <p:spPr>
+          <a:xfrm>
+            <a:off x="6718852" y="5420139"/>
+            <a:ext cx="4873487" cy="369332"/>
+          </a:xfrm>
+          <a:prstGeom prst="rect">
+            <a:avLst/>
+          </a:prstGeom>
+          <a:noFill/>
+        </p:spPr>
+        <p:txBody>
+          <a:bodyPr wrap="square" rtlCol="0">
+            <a:spAutoFit/>
+          </a:bodyPr>
+          <a:lstStyle/>
+          <a:p>
+            <a:r>
+              <a:rPr lang="es-PE" dirty="0"/>
+              <a:t>Figura 4: Muestra un árbol AVL balanceado</a:t>
+            </a:r>
+          </a:p>
+        </p:txBody>
+      </p:sp>
     </p:spTree>
     <p:extLst>
       <p:ext uri="{BB962C8B-B14F-4D97-AF65-F5344CB8AC3E}">
@@ -4805,6 +4938,41 @@
           </a:prstGeom>
         </p:spPr>
       </p:pic>
+      <p:sp>
+        <p:nvSpPr>
+          <p:cNvPr id="3" name="CuadroTexto 2">
+            <a:extLst>
+              <a:ext uri="{FF2B5EF4-FFF2-40B4-BE49-F238E27FC236}">
+                <a16:creationId xmlns:a16="http://schemas.microsoft.com/office/drawing/2014/main" id="{E0EC147D-8DBF-4A7C-ACFF-5E9706987A27}"/>
+              </a:ext>
+            </a:extLst>
+          </p:cNvPr>
+          <p:cNvSpPr txBox="1"/>
+          <p:nvPr/>
+        </p:nvSpPr>
+        <p:spPr>
+          <a:xfrm>
+            <a:off x="5300870" y="6265729"/>
+            <a:ext cx="3565864" cy="369332"/>
+          </a:xfrm>
+          <a:prstGeom prst="rect">
+            <a:avLst/>
+          </a:prstGeom>
+          <a:noFill/>
+        </p:spPr>
+        <p:txBody>
+          <a:bodyPr wrap="square" rtlCol="0">
+            <a:spAutoFit/>
+          </a:bodyPr>
+          <a:lstStyle/>
+          <a:p>
+            <a:r>
+              <a:rPr lang="es-PE" dirty="0"/>
+              <a:t>Figura 5: Muestra el Árbol obtenido</a:t>
+            </a:r>
+          </a:p>
+        </p:txBody>
+      </p:sp>
     </p:spTree>
     <p:extLst>
       <p:ext uri="{BB962C8B-B14F-4D97-AF65-F5344CB8AC3E}">

</xml_diff>